<commit_message>
Added Additional Conclusion Slide
</commit_message>
<xml_diff>
--- a/Flatiron_Mod_1_Slides.pptx
+++ b/Flatiron_Mod_1_Slides.pptx
@@ -16,6 +16,7 @@
     <p:sldId id="264" r:id="rId10"/>
     <p:sldId id="265" r:id="rId11"/>
     <p:sldId id="267" r:id="rId12"/>
+    <p:sldId id="268" r:id="rId13"/>
   </p:sldIdLst>
   <p:sldSz cx="12192000" cy="6858000"/>
   <p:notesSz cx="6858000" cy="9144000"/>
@@ -6450,6 +6451,137 @@
 </p:sld>
 </file>
 
+<file path=ppt/slides/slide12.xml><?xml version="1.0" encoding="utf-8"?>
+<p:sld xmlns:a="http://schemas.openxmlformats.org/drawingml/2006/main" xmlns:r="http://schemas.openxmlformats.org/officeDocument/2006/relationships" xmlns:p="http://schemas.openxmlformats.org/presentationml/2006/main">
+  <p:cSld>
+    <p:spTree>
+      <p:nvGrpSpPr>
+        <p:cNvPr id="1" name=""/>
+        <p:cNvGrpSpPr/>
+        <p:nvPr/>
+      </p:nvGrpSpPr>
+      <p:grpSpPr>
+        <a:xfrm>
+          <a:off x="0" y="0"/>
+          <a:ext cx="0" cy="0"/>
+          <a:chOff x="0" y="0"/>
+          <a:chExt cx="0" cy="0"/>
+        </a:xfrm>
+      </p:grpSpPr>
+      <p:sp>
+        <p:nvSpPr>
+          <p:cNvPr id="2" name="Title 1">
+            <a:extLst>
+              <a:ext uri="{FF2B5EF4-FFF2-40B4-BE49-F238E27FC236}">
+                <a16:creationId xmlns:a16="http://schemas.microsoft.com/office/drawing/2014/main" id="{69556C86-D08B-3440-8B92-5EC8BB2ECD5D}"/>
+              </a:ext>
+            </a:extLst>
+          </p:cNvPr>
+          <p:cNvSpPr>
+            <a:spLocks noGrp="1"/>
+          </p:cNvSpPr>
+          <p:nvPr>
+            <p:ph type="title"/>
+          </p:nvPr>
+        </p:nvSpPr>
+        <p:spPr/>
+        <p:txBody>
+          <a:bodyPr/>
+          <a:lstStyle/>
+          <a:p>
+            <a:r>
+              <a:rPr lang="en-US" sz="3000" dirty="0"/>
+              <a:t>Step 9: Future work, correction and questions</a:t>
+            </a:r>
+            <a:br>
+              <a:rPr lang="en-US" sz="3000" dirty="0"/>
+            </a:br>
+            <a:endParaRPr lang="en-US" sz="3000" dirty="0"/>
+          </a:p>
+        </p:txBody>
+      </p:sp>
+      <p:sp>
+        <p:nvSpPr>
+          <p:cNvPr id="3" name="Content Placeholder 2">
+            <a:extLst>
+              <a:ext uri="{FF2B5EF4-FFF2-40B4-BE49-F238E27FC236}">
+                <a16:creationId xmlns:a16="http://schemas.microsoft.com/office/drawing/2014/main" id="{E64431E4-9B33-C14E-84F3-780676FE5846}"/>
+              </a:ext>
+            </a:extLst>
+          </p:cNvPr>
+          <p:cNvSpPr>
+            <a:spLocks noGrp="1"/>
+          </p:cNvSpPr>
+          <p:nvPr>
+            <p:ph idx="1"/>
+          </p:nvPr>
+        </p:nvSpPr>
+        <p:spPr>
+          <a:xfrm>
+            <a:off x="646111" y="1550642"/>
+            <a:ext cx="8946541" cy="4195481"/>
+          </a:xfrm>
+        </p:spPr>
+        <p:txBody>
+          <a:bodyPr/>
+          <a:lstStyle/>
+          <a:p>
+            <a:r>
+              <a:rPr lang="en-US" dirty="0"/>
+              <a:t>Review variable choices – Grade / Square foot living </a:t>
+            </a:r>
+          </a:p>
+          <a:p>
+            <a:pPr marL="0" indent="0">
+              <a:buNone/>
+            </a:pPr>
+            <a:endParaRPr lang="en-US" dirty="0"/>
+          </a:p>
+          <a:p>
+            <a:r>
+              <a:rPr lang="en-US" dirty="0"/>
+              <a:t>Apply correct treatment to categorical variable </a:t>
+            </a:r>
+          </a:p>
+          <a:p>
+            <a:endParaRPr lang="en-US" dirty="0"/>
+          </a:p>
+          <a:p>
+            <a:r>
+              <a:rPr lang="en-US" dirty="0"/>
+              <a:t>Develop more specific business questions </a:t>
+            </a:r>
+          </a:p>
+          <a:p>
+            <a:pPr marL="0" indent="0">
+              <a:buNone/>
+            </a:pPr>
+            <a:endParaRPr lang="en-US" dirty="0"/>
+          </a:p>
+          <a:p>
+            <a:pPr marL="0" indent="0">
+              <a:buNone/>
+            </a:pPr>
+            <a:r>
+              <a:rPr lang="en-US" dirty="0"/>
+              <a:t>Thank you for listening! We will do our best to answer any questions you have.</a:t>
+            </a:r>
+          </a:p>
+        </p:txBody>
+      </p:sp>
+    </p:spTree>
+    <p:extLst>
+      <p:ext uri="{BB962C8B-B14F-4D97-AF65-F5344CB8AC3E}">
+        <p14:creationId xmlns:p14="http://schemas.microsoft.com/office/powerpoint/2010/main" val="3075179156"/>
+      </p:ext>
+    </p:extLst>
+  </p:cSld>
+  <p:clrMapOvr>
+    <a:masterClrMapping/>
+  </p:clrMapOvr>
+</p:sld>
+</file>
+
 <file path=ppt/slides/slide2.xml><?xml version="1.0" encoding="utf-8"?>
 <p:sld xmlns:a="http://schemas.openxmlformats.org/drawingml/2006/main" xmlns:r="http://schemas.openxmlformats.org/officeDocument/2006/relationships" xmlns:p="http://schemas.openxmlformats.org/presentationml/2006/main">
   <p:cSld>
@@ -6744,7 +6876,7 @@
         </p:spPr>
         <p:txBody>
           <a:bodyPr>
-            <a:normAutofit fontScale="85000" lnSpcReduction="20000"/>
+            <a:normAutofit fontScale="70000" lnSpcReduction="20000"/>
           </a:bodyPr>
           <a:lstStyle/>
           <a:p>
@@ -6816,7 +6948,16 @@
           <a:p>
             <a:r>
               <a:rPr lang="en-US" dirty="0"/>
-              <a:t>Step 8: interpretation, follows ups and correction of model</a:t>
+              <a:t>Step 8: interpretation of models</a:t>
+            </a:r>
+          </a:p>
+          <a:p>
+            <a:endParaRPr lang="en-US" dirty="0"/>
+          </a:p>
+          <a:p>
+            <a:r>
+              <a:rPr lang="en-US" dirty="0"/>
+              <a:t>Step 9: follows ups, correction and questions</a:t>
             </a:r>
           </a:p>
           <a:p>

</xml_diff>